<commit_message>
Correct Among Us release date
This is extremely important
</commit_message>
<xml_diff>
--- a/docpac_mar10/Extraneous Communications.pptx
+++ b/docpac_mar10/Extraneous Communications.pptx
@@ -111,6 +111,11 @@
       </a:defRPr>
     </a:lvl9pPr>
   </p:defaultTextStyle>
+  <p:extLst>
+    <p:ext uri="{EFAFB233-063F-42B5-8137-9DF3F51BA10A}">
+      <p15:sldGuideLst xmlns:p15="http://schemas.microsoft.com/office/powerpoint/2012/main"/>
+    </p:ext>
+  </p:extLst>
 </p:presentation>
 </file>
 
@@ -334,6 +339,30 @@
       </pc:sldChg>
     </pc:docChg>
   </pc:docChgLst>
+  <pc:docChgLst>
+    <pc:chgData name="Birkeland, John" userId="074c16a1-eede-4221-8d47-ffda6aeed3e7" providerId="ADAL" clId="{7FCA13F4-B544-4085-995F-F7210B8FC933}"/>
+    <pc:docChg chg="modSld">
+      <pc:chgData name="Birkeland, John" userId="074c16a1-eede-4221-8d47-ffda6aeed3e7" providerId="ADAL" clId="{7FCA13F4-B544-4085-995F-F7210B8FC933}" dt="2022-03-10T19:26:21.267" v="3" actId="20577"/>
+      <pc:docMkLst>
+        <pc:docMk/>
+      </pc:docMkLst>
+      <pc:sldChg chg="modSp">
+        <pc:chgData name="Birkeland, John" userId="074c16a1-eede-4221-8d47-ffda6aeed3e7" providerId="ADAL" clId="{7FCA13F4-B544-4085-995F-F7210B8FC933}" dt="2022-03-10T19:26:21.267" v="3" actId="20577"/>
+        <pc:sldMkLst>
+          <pc:docMk/>
+          <pc:sldMk cId="538530880" sldId="262"/>
+        </pc:sldMkLst>
+        <pc:spChg chg="mod">
+          <ac:chgData name="Birkeland, John" userId="074c16a1-eede-4221-8d47-ffda6aeed3e7" providerId="ADAL" clId="{7FCA13F4-B544-4085-995F-F7210B8FC933}" dt="2022-03-10T19:26:21.267" v="3" actId="20577"/>
+          <ac:spMkLst>
+            <pc:docMk/>
+            <pc:sldMk cId="538530880" sldId="262"/>
+            <ac:spMk id="3" creationId="{1E5EBEF0-8254-4BC1-A35D-018C5E98F4A5}"/>
+          </ac:spMkLst>
+        </pc:spChg>
+      </pc:sldChg>
+    </pc:docChg>
+  </pc:docChgLst>
 </pc:chgInfo>
 </file>
 
@@ -484,7 +513,7 @@
           <a:p>
             <a:fld id="{CEEA402A-CE57-4A59-960F-9366E0D312C3}" type="datetimeFigureOut">
               <a:rPr lang="en-US" smtClean="0"/>
-              <a:t>3/9/2022</a:t>
+              <a:t>3/10/2022</a:t>
             </a:fld>
             <a:endParaRPr lang="en-US"/>
           </a:p>
@@ -682,7 +711,7 @@
           <a:p>
             <a:fld id="{CEEA402A-CE57-4A59-960F-9366E0D312C3}" type="datetimeFigureOut">
               <a:rPr lang="en-US" smtClean="0"/>
-              <a:t>3/9/2022</a:t>
+              <a:t>3/10/2022</a:t>
             </a:fld>
             <a:endParaRPr lang="en-US"/>
           </a:p>
@@ -890,7 +919,7 @@
           <a:p>
             <a:fld id="{CEEA402A-CE57-4A59-960F-9366E0D312C3}" type="datetimeFigureOut">
               <a:rPr lang="en-US" smtClean="0"/>
-              <a:t>3/9/2022</a:t>
+              <a:t>3/10/2022</a:t>
             </a:fld>
             <a:endParaRPr lang="en-US"/>
           </a:p>
@@ -1088,7 +1117,7 @@
           <a:p>
             <a:fld id="{CEEA402A-CE57-4A59-960F-9366E0D312C3}" type="datetimeFigureOut">
               <a:rPr lang="en-US" smtClean="0"/>
-              <a:t>3/9/2022</a:t>
+              <a:t>3/10/2022</a:t>
             </a:fld>
             <a:endParaRPr lang="en-US"/>
           </a:p>
@@ -1363,7 +1392,7 @@
           <a:p>
             <a:fld id="{CEEA402A-CE57-4A59-960F-9366E0D312C3}" type="datetimeFigureOut">
               <a:rPr lang="en-US" smtClean="0"/>
-              <a:t>3/9/2022</a:t>
+              <a:t>3/10/2022</a:t>
             </a:fld>
             <a:endParaRPr lang="en-US"/>
           </a:p>
@@ -1628,7 +1657,7 @@
           <a:p>
             <a:fld id="{CEEA402A-CE57-4A59-960F-9366E0D312C3}" type="datetimeFigureOut">
               <a:rPr lang="en-US" smtClean="0"/>
-              <a:t>3/9/2022</a:t>
+              <a:t>3/10/2022</a:t>
             </a:fld>
             <a:endParaRPr lang="en-US"/>
           </a:p>
@@ -2040,7 +2069,7 @@
           <a:p>
             <a:fld id="{CEEA402A-CE57-4A59-960F-9366E0D312C3}" type="datetimeFigureOut">
               <a:rPr lang="en-US" smtClean="0"/>
-              <a:t>3/9/2022</a:t>
+              <a:t>3/10/2022</a:t>
             </a:fld>
             <a:endParaRPr lang="en-US"/>
           </a:p>
@@ -2181,7 +2210,7 @@
           <a:p>
             <a:fld id="{CEEA402A-CE57-4A59-960F-9366E0D312C3}" type="datetimeFigureOut">
               <a:rPr lang="en-US" smtClean="0"/>
-              <a:t>3/9/2022</a:t>
+              <a:t>3/10/2022</a:t>
             </a:fld>
             <a:endParaRPr lang="en-US"/>
           </a:p>
@@ -2294,7 +2323,7 @@
           <a:p>
             <a:fld id="{CEEA402A-CE57-4A59-960F-9366E0D312C3}" type="datetimeFigureOut">
               <a:rPr lang="en-US" smtClean="0"/>
-              <a:t>3/9/2022</a:t>
+              <a:t>3/10/2022</a:t>
             </a:fld>
             <a:endParaRPr lang="en-US"/>
           </a:p>
@@ -2605,7 +2634,7 @@
           <a:p>
             <a:fld id="{CEEA402A-CE57-4A59-960F-9366E0D312C3}" type="datetimeFigureOut">
               <a:rPr lang="en-US" smtClean="0"/>
-              <a:t>3/9/2022</a:t>
+              <a:t>3/10/2022</a:t>
             </a:fld>
             <a:endParaRPr lang="en-US"/>
           </a:p>
@@ -2893,7 +2922,7 @@
           <a:p>
             <a:fld id="{CEEA402A-CE57-4A59-960F-9366E0D312C3}" type="datetimeFigureOut">
               <a:rPr lang="en-US" smtClean="0"/>
-              <a:t>3/9/2022</a:t>
+              <a:t>3/10/2022</a:t>
             </a:fld>
             <a:endParaRPr lang="en-US"/>
           </a:p>
@@ -3134,7 +3163,7 @@
           <a:p>
             <a:fld id="{CEEA402A-CE57-4A59-960F-9366E0D312C3}" type="datetimeFigureOut">
               <a:rPr lang="en-US" smtClean="0"/>
-              <a:t>3/9/2022</a:t>
+              <a:t>3/10/2022</a:t>
             </a:fld>
             <a:endParaRPr lang="en-US"/>
           </a:p>
@@ -6308,7 +6337,7 @@
             <a:pPr lvl="1"/>
             <a:r>
               <a:rPr lang="en-US" sz="2000" dirty="0"/>
-              <a:t>Talking about cars and the 2020 hit game Among Us in programming class is BS</a:t>
+              <a:t>Talking about cars and the 2018 hit game Among Us in programming class is BS</a:t>
             </a:r>
           </a:p>
           <a:p>
@@ -7071,6 +7100,21 @@
 </file>
 
 <file path=customXml/item1.xml><?xml version="1.0" encoding="utf-8"?>
+<p:properties xmlns:p="http://schemas.microsoft.com/office/2006/metadata/properties" xmlns:xsi="http://www.w3.org/2001/XMLSchema-instance" xmlns:pc="http://schemas.microsoft.com/office/infopath/2007/PartnerControls">
+  <documentManagement/>
+</p:properties>
+</file>
+
+<file path=customXml/item2.xml><?xml version="1.0" encoding="utf-8"?>
+<?mso-contentType ?>
+<FormTemplates xmlns="http://schemas.microsoft.com/sharepoint/v3/contenttype/forms">
+  <Display>DocumentLibraryForm</Display>
+  <Edit>DocumentLibraryForm</Edit>
+  <New>DocumentLibraryForm</New>
+</FormTemplates>
+</file>
+
+<file path=customXml/item3.xml><?xml version="1.0" encoding="utf-8"?>
 <ct:contentTypeSchema xmlns:ct="http://schemas.microsoft.com/office/2006/metadata/contentType" xmlns:ma="http://schemas.microsoft.com/office/2006/metadata/properties/metaAttributes" ct:_="" ma:_="" ma:contentTypeName="Document" ma:contentTypeID="0x010100ABA223F759147049B9D8A25DED07DD24" ma:contentTypeVersion="14" ma:contentTypeDescription="Create a new document." ma:contentTypeScope="" ma:versionID="754cccfe17833f4d06e0267dc9c12ab7">
   <xsd:schema xmlns:xsd="http://www.w3.org/2001/XMLSchema" xmlns:xs="http://www.w3.org/2001/XMLSchema" xmlns:p="http://schemas.microsoft.com/office/2006/metadata/properties" xmlns:ns3="cc9255bc-4d99-4f42-bba5-857cbcc6e725" xmlns:ns4="fc2bff61-6a31-4c51-9f32-b9bba46405e5" targetNamespace="http://schemas.microsoft.com/office/2006/metadata/properties" ma:root="true" ma:fieldsID="e32414dc8724dfdc561355c14801bc84" ns3:_="" ns4:_="">
     <xsd:import namespace="cc9255bc-4d99-4f42-bba5-857cbcc6e725"/>
@@ -7299,22 +7343,32 @@
 </ct:contentTypeSchema>
 </file>
 
-<file path=customXml/item2.xml><?xml version="1.0" encoding="utf-8"?>
-<?mso-contentType ?>
-<FormTemplates xmlns="http://schemas.microsoft.com/sharepoint/v3/contenttype/forms">
-  <Display>DocumentLibraryForm</Display>
-  <Edit>DocumentLibraryForm</Edit>
-  <New>DocumentLibraryForm</New>
-</FormTemplates>
+<file path=customXml/itemProps1.xml><?xml version="1.0" encoding="utf-8"?>
+<ds:datastoreItem xmlns:ds="http://schemas.openxmlformats.org/officeDocument/2006/customXml" ds:itemID="{6B98BF2F-7B6F-4E89-B005-2278DE544170}">
+  <ds:schemaRefs>
+    <ds:schemaRef ds:uri="http://schemas.microsoft.com/office/2006/documentManagement/types"/>
+    <ds:schemaRef ds:uri="http://purl.org/dc/dcmitype/"/>
+    <ds:schemaRef ds:uri="http://www.w3.org/XML/1998/namespace"/>
+    <ds:schemaRef ds:uri="http://schemas.microsoft.com/office/infopath/2007/PartnerControls"/>
+    <ds:schemaRef ds:uri="cc9255bc-4d99-4f42-bba5-857cbcc6e725"/>
+    <ds:schemaRef ds:uri="http://purl.org/dc/elements/1.1/"/>
+    <ds:schemaRef ds:uri="http://schemas.openxmlformats.org/package/2006/metadata/core-properties"/>
+    <ds:schemaRef ds:uri="http://purl.org/dc/terms/"/>
+    <ds:schemaRef ds:uri="fc2bff61-6a31-4c51-9f32-b9bba46405e5"/>
+    <ds:schemaRef ds:uri="http://schemas.microsoft.com/office/2006/metadata/properties"/>
+  </ds:schemaRefs>
+</ds:datastoreItem>
 </file>
 
-<file path=customXml/item3.xml><?xml version="1.0" encoding="utf-8"?>
-<p:properties xmlns:p="http://schemas.microsoft.com/office/2006/metadata/properties" xmlns:xsi="http://www.w3.org/2001/XMLSchema-instance" xmlns:pc="http://schemas.microsoft.com/office/infopath/2007/PartnerControls">
-  <documentManagement/>
-</p:properties>
+<file path=customXml/itemProps2.xml><?xml version="1.0" encoding="utf-8"?>
+<ds:datastoreItem xmlns:ds="http://schemas.openxmlformats.org/officeDocument/2006/customXml" ds:itemID="{53C87792-51BD-4B15-BF28-AA886F55B545}">
+  <ds:schemaRefs>
+    <ds:schemaRef ds:uri="http://schemas.microsoft.com/sharepoint/v3/contenttype/forms"/>
+  </ds:schemaRefs>
+</ds:datastoreItem>
 </file>
 
-<file path=customXml/itemProps1.xml><?xml version="1.0" encoding="utf-8"?>
+<file path=customXml/itemProps3.xml><?xml version="1.0" encoding="utf-8"?>
 <ds:datastoreItem xmlns:ds="http://schemas.openxmlformats.org/officeDocument/2006/customXml" ds:itemID="{F24FD403-C9A7-40B8-A3F5-F5A107BCC6E6}">
   <ds:schemaRefs>
     <ds:schemaRef ds:uri="http://schemas.microsoft.com/office/2006/metadata/contentType"/>
@@ -7331,29 +7385,4 @@
     <ds:schemaRef ds:uri="http://schemas.microsoft.com/internal/obd"/>
   </ds:schemaRefs>
 </ds:datastoreItem>
-</file>
-
-<file path=customXml/itemProps2.xml><?xml version="1.0" encoding="utf-8"?>
-<ds:datastoreItem xmlns:ds="http://schemas.openxmlformats.org/officeDocument/2006/customXml" ds:itemID="{53C87792-51BD-4B15-BF28-AA886F55B545}">
-  <ds:schemaRefs>
-    <ds:schemaRef ds:uri="http://schemas.microsoft.com/sharepoint/v3/contenttype/forms"/>
-  </ds:schemaRefs>
-</ds:datastoreItem>
-</file>
-
-<file path=customXml/itemProps3.xml><?xml version="1.0" encoding="utf-8"?>
-<ds:datastoreItem xmlns:ds="http://schemas.openxmlformats.org/officeDocument/2006/customXml" ds:itemID="{6B98BF2F-7B6F-4E89-B005-2278DE544170}">
-  <ds:schemaRefs>
-    <ds:schemaRef ds:uri="http://schemas.microsoft.com/office/2006/documentManagement/types"/>
-    <ds:schemaRef ds:uri="http://purl.org/dc/dcmitype/"/>
-    <ds:schemaRef ds:uri="fc2bff61-6a31-4c51-9f32-b9bba46405e5"/>
-    <ds:schemaRef ds:uri="http://schemas.microsoft.com/office/infopath/2007/PartnerControls"/>
-    <ds:schemaRef ds:uri="http://purl.org/dc/elements/1.1/"/>
-    <ds:schemaRef ds:uri="http://schemas.openxmlformats.org/package/2006/metadata/core-properties"/>
-    <ds:schemaRef ds:uri="http://purl.org/dc/terms/"/>
-    <ds:schemaRef ds:uri="cc9255bc-4d99-4f42-bba5-857cbcc6e725"/>
-    <ds:schemaRef ds:uri="http://schemas.microsoft.com/office/2006/metadata/properties"/>
-    <ds:schemaRef ds:uri="http://www.w3.org/XML/1998/namespace"/>
-  </ds:schemaRefs>
-</ds:datastoreItem>
 </file>
</xml_diff>